<commit_message>
Condensed master script and added Fig 3 code
</commit_message>
<xml_diff>
--- a/EEOBFINALPRESENTATION.pptx
+++ b/EEOBFINALPRESENTATION.pptx
@@ -112,6 +112,22 @@
       </a:defRPr>
     </a:lvl9pPr>
   </p:defaultTextStyle>
+  <p:extLst>
+    <p:ext uri="{EFAFB233-063F-42B5-8137-9DF3F51BA10A}">
+      <p15:sldGuideLst xmlns:p15="http://schemas.microsoft.com/office/powerpoint/2012/main">
+        <p15:guide id="1" orient="horz" pos="2160">
+          <p15:clr>
+            <a:srgbClr val="A4A3A4"/>
+          </p15:clr>
+        </p15:guide>
+        <p15:guide id="2" pos="2880">
+          <p15:clr>
+            <a:srgbClr val="A4A3A4"/>
+          </p15:clr>
+        </p15:guide>
+      </p15:sldGuideLst>
+    </p:ext>
+  </p:extLst>
 </p:presentation>
 </file>
 
@@ -197,7 +213,7 @@
           <a:p>
             <a:fld id="{83AB5C4C-7B5B-4397-9F1D-2D134E23F637}" type="datetimeFigureOut">
               <a:rPr lang="en-US" smtClean="0"/>
-              <a:t>4/18/2017</a:t>
+              <a:t>4/21/2017</a:t>
             </a:fld>
             <a:endParaRPr lang="en-US"/>
           </a:p>
@@ -752,7 +768,7 @@
           <a:p>
             <a:fld id="{EAFCBDC8-3559-4163-8DB0-5A91FB2678CA}" type="datetimeFigureOut">
               <a:rPr lang="en-US" smtClean="0"/>
-              <a:t>4/18/2017</a:t>
+              <a:t>4/21/2017</a:t>
             </a:fld>
             <a:endParaRPr lang="en-US"/>
           </a:p>
@@ -922,7 +938,7 @@
           <a:p>
             <a:fld id="{EAFCBDC8-3559-4163-8DB0-5A91FB2678CA}" type="datetimeFigureOut">
               <a:rPr lang="en-US" smtClean="0"/>
-              <a:t>4/18/2017</a:t>
+              <a:t>4/21/2017</a:t>
             </a:fld>
             <a:endParaRPr lang="en-US"/>
           </a:p>
@@ -1102,7 +1118,7 @@
           <a:p>
             <a:fld id="{EAFCBDC8-3559-4163-8DB0-5A91FB2678CA}" type="datetimeFigureOut">
               <a:rPr lang="en-US" smtClean="0"/>
-              <a:t>4/18/2017</a:t>
+              <a:t>4/21/2017</a:t>
             </a:fld>
             <a:endParaRPr lang="en-US"/>
           </a:p>
@@ -1272,7 +1288,7 @@
           <a:p>
             <a:fld id="{EAFCBDC8-3559-4163-8DB0-5A91FB2678CA}" type="datetimeFigureOut">
               <a:rPr lang="en-US" smtClean="0"/>
-              <a:t>4/18/2017</a:t>
+              <a:t>4/21/2017</a:t>
             </a:fld>
             <a:endParaRPr lang="en-US"/>
           </a:p>
@@ -1518,7 +1534,7 @@
           <a:p>
             <a:fld id="{EAFCBDC8-3559-4163-8DB0-5A91FB2678CA}" type="datetimeFigureOut">
               <a:rPr lang="en-US" smtClean="0"/>
-              <a:t>4/18/2017</a:t>
+              <a:t>4/21/2017</a:t>
             </a:fld>
             <a:endParaRPr lang="en-US"/>
           </a:p>
@@ -1806,7 +1822,7 @@
           <a:p>
             <a:fld id="{EAFCBDC8-3559-4163-8DB0-5A91FB2678CA}" type="datetimeFigureOut">
               <a:rPr lang="en-US" smtClean="0"/>
-              <a:t>4/18/2017</a:t>
+              <a:t>4/21/2017</a:t>
             </a:fld>
             <a:endParaRPr lang="en-US"/>
           </a:p>
@@ -2228,7 +2244,7 @@
           <a:p>
             <a:fld id="{EAFCBDC8-3559-4163-8DB0-5A91FB2678CA}" type="datetimeFigureOut">
               <a:rPr lang="en-US" smtClean="0"/>
-              <a:t>4/18/2017</a:t>
+              <a:t>4/21/2017</a:t>
             </a:fld>
             <a:endParaRPr lang="en-US"/>
           </a:p>
@@ -2346,7 +2362,7 @@
           <a:p>
             <a:fld id="{EAFCBDC8-3559-4163-8DB0-5A91FB2678CA}" type="datetimeFigureOut">
               <a:rPr lang="en-US" smtClean="0"/>
-              <a:t>4/18/2017</a:t>
+              <a:t>4/21/2017</a:t>
             </a:fld>
             <a:endParaRPr lang="en-US"/>
           </a:p>
@@ -2441,7 +2457,7 @@
           <a:p>
             <a:fld id="{EAFCBDC8-3559-4163-8DB0-5A91FB2678CA}" type="datetimeFigureOut">
               <a:rPr lang="en-US" smtClean="0"/>
-              <a:t>4/18/2017</a:t>
+              <a:t>4/21/2017</a:t>
             </a:fld>
             <a:endParaRPr lang="en-US"/>
           </a:p>
@@ -2718,7 +2734,7 @@
           <a:p>
             <a:fld id="{EAFCBDC8-3559-4163-8DB0-5A91FB2678CA}" type="datetimeFigureOut">
               <a:rPr lang="en-US" smtClean="0"/>
-              <a:t>4/18/2017</a:t>
+              <a:t>4/21/2017</a:t>
             </a:fld>
             <a:endParaRPr lang="en-US"/>
           </a:p>
@@ -2971,7 +2987,7 @@
           <a:p>
             <a:fld id="{EAFCBDC8-3559-4163-8DB0-5A91FB2678CA}" type="datetimeFigureOut">
               <a:rPr lang="en-US" smtClean="0"/>
-              <a:t>4/18/2017</a:t>
+              <a:t>4/21/2017</a:t>
             </a:fld>
             <a:endParaRPr lang="en-US"/>
           </a:p>
@@ -3184,7 +3200,7 @@
           <a:p>
             <a:fld id="{EAFCBDC8-3559-4163-8DB0-5A91FB2678CA}" type="datetimeFigureOut">
               <a:rPr lang="en-US" smtClean="0"/>
-              <a:t>4/18/2017</a:t>
+              <a:t>4/21/2017</a:t>
             </a:fld>
             <a:endParaRPr lang="en-US"/>
           </a:p>
@@ -3718,7 +3734,15 @@
           <a:p>
             <a:r>
               <a:rPr lang="en-US" dirty="0" smtClean="0"/>
-              <a:t>Re-documented by Justin Conover, Ching-Yi Lao, and Emma Miller</a:t>
+              <a:t>Re-documented by Justin Conover, Ching-Yi </a:t>
+            </a:r>
+            <a:r>
+              <a:rPr lang="en-US" dirty="0" smtClean="0"/>
+              <a:t>Liao</a:t>
+            </a:r>
+            <a:r>
+              <a:rPr lang="en-US" dirty="0" smtClean="0"/>
+              <a:t>, and Emma Miller</a:t>
             </a:r>
             <a:endParaRPr lang="en-US" dirty="0"/>
           </a:p>

</xml_diff>